<commit_message>
Revert "Merge remote-tracking branch 'Machine_a_sous-JS/master'"
This reverts commit 8b0be7e2a87cc4656268d93bea7c76659abac51d.
</commit_message>
<xml_diff>
--- a/projet à rendre/presentation.pptx
+++ b/projet à rendre/presentation.pptx
@@ -6117,7 +6117,7 @@
           <a:p>
             <a:r>
               <a:rPr lang="fr-FR" sz="1600" dirty="0"/>
-              <a:t>Membres du groupe : Herve Kay , Sarah Simon , Aminata Soumaré ndiaye</a:t>
+              <a:t>Membres du groupes : Herve Kay , Sarah Simon , Aminata Soumaré ndiaye</a:t>
             </a:r>
           </a:p>
         </p:txBody>
@@ -6377,48 +6377,56 @@
             <p:ph type="title"/>
           </p:nvPr>
         </p:nvSpPr>
-        <p:spPr>
-          <a:xfrm>
-            <a:off x="474733" y="319260"/>
-            <a:ext cx="11717267" cy="773312"/>
-          </a:xfrm>
-        </p:spPr>
-        <p:txBody>
-          <a:bodyPr/>
-          <a:lstStyle/>
-          <a:p>
-            <a:r>
-              <a:rPr lang="fr-FR" dirty="0"/>
-              <a:t>Pour la fonction qui vérifie les variables</a:t>
-            </a:r>
-          </a:p>
-        </p:txBody>
-      </p:sp>
-      <p:pic>
-        <p:nvPicPr>
-          <p:cNvPr id="4" name="Espace réservé du contenu 3"/>
-          <p:cNvPicPr>
-            <a:picLocks noGrp="1" noChangeAspect="1"/>
-          </p:cNvPicPr>
+        <p:spPr/>
+        <p:txBody>
+          <a:bodyPr>
+            <a:normAutofit/>
+          </a:bodyPr>
+          <a:lstStyle/>
+          <a:p>
+            <a:r>
+              <a:rPr lang="fr-FR" sz="4400" dirty="0"/>
+              <a:t>Le serveur local</a:t>
+            </a:r>
+          </a:p>
+        </p:txBody>
+      </p:sp>
+      <p:sp>
+        <p:nvSpPr>
+          <p:cNvPr id="3" name="Espace réservé du contenu 2"/>
+          <p:cNvSpPr>
+            <a:spLocks noGrp="1"/>
+          </p:cNvSpPr>
           <p:nvPr>
             <p:ph sz="quarter" idx="13"/>
           </p:nvPr>
-        </p:nvPicPr>
-        <p:blipFill rotWithShape="1">
-          <a:blip r:embed="rId2"/>
-          <a:srcRect l="13950" t="6708" r="19182" b="7417"/>
-          <a:stretch/>
-        </p:blipFill>
-        <p:spPr>
-          <a:xfrm>
-            <a:off x="1893729" y="1092572"/>
-            <a:ext cx="8879274" cy="5321146"/>
-          </a:xfrm>
-          <a:prstGeom prst="rect">
-            <a:avLst/>
-          </a:prstGeom>
-        </p:spPr>
-      </p:pic>
+        </p:nvSpPr>
+        <p:spPr/>
+        <p:txBody>
+          <a:bodyPr>
+            <a:normAutofit/>
+          </a:bodyPr>
+          <a:lstStyle/>
+          <a:p>
+            <a:r>
+              <a:rPr lang="fr-FR" sz="2800" dirty="0"/>
+              <a:t>Par manque de connaissances nous n’avons pas pu mettre un serveur local fonctionnel</a:t>
+            </a:r>
+          </a:p>
+          <a:p>
+            <a:r>
+              <a:rPr lang="fr-FR" sz="2800" dirty="0"/>
+              <a:t>Nous avons eu des complications au niveau de la création du serveur ainsi qu’au niveau de la création d’index </a:t>
+            </a:r>
+          </a:p>
+          <a:p>
+            <a:r>
+              <a:rPr lang="fr-FR" sz="2800" dirty="0"/>
+              <a:t>Nous avons tenté d’utiliser web SQL, sans succès.</a:t>
+            </a:r>
+          </a:p>
+        </p:txBody>
+      </p:sp>
     </p:spTree>
     <p:extLst>
       <p:ext uri="{BB962C8B-B14F-4D97-AF65-F5344CB8AC3E}">

</xml_diff>

<commit_message>
Auto stash before revert of "Merge remote-tracking branch 'Machine_a_sous-JS/master'"
</commit_message>
<xml_diff>
--- a/projet à rendre/presentation.pptx
+++ b/projet à rendre/presentation.pptx
@@ -4,6 +4,9 @@
   <p:sldMasterIdLst>
     <p:sldMasterId id="2147483648" r:id="rId1"/>
   </p:sldMasterIdLst>
+  <p:notesMasterIdLst>
+    <p:notesMasterId r:id="rId6"/>
+  </p:notesMasterIdLst>
   <p:sldIdLst>
     <p:sldId id="256" r:id="rId2"/>
     <p:sldId id="257" r:id="rId3"/>
@@ -119,6 +122,355 @@
 <p1510:revInfo xmlns:a="http://schemas.openxmlformats.org/drawingml/2006/main" xmlns:r="http://schemas.openxmlformats.org/officeDocument/2006/relationships" xmlns:p1510="http://schemas.microsoft.com/office/powerpoint/2015/10/main"/>
 </file>
 
+<file path=ppt/notesMasters/notesMaster1.xml><?xml version="1.0" encoding="utf-8"?>
+<p:notesMaster xmlns:a="http://schemas.openxmlformats.org/drawingml/2006/main" xmlns:r="http://schemas.openxmlformats.org/officeDocument/2006/relationships" xmlns:p="http://schemas.openxmlformats.org/presentationml/2006/main">
+  <p:cSld>
+    <p:bg>
+      <p:bgRef idx="1001">
+        <a:schemeClr val="bg1"/>
+      </p:bgRef>
+    </p:bg>
+    <p:spTree>
+      <p:nvGrpSpPr>
+        <p:cNvPr id="1" name=""/>
+        <p:cNvGrpSpPr/>
+        <p:nvPr/>
+      </p:nvGrpSpPr>
+      <p:grpSpPr>
+        <a:xfrm>
+          <a:off x="0" y="0"/>
+          <a:ext cx="0" cy="0"/>
+          <a:chOff x="0" y="0"/>
+          <a:chExt cx="0" cy="0"/>
+        </a:xfrm>
+      </p:grpSpPr>
+      <p:sp>
+        <p:nvSpPr>
+          <p:cNvPr id="2" name="Espace réservé de l'en-tête 1"/>
+          <p:cNvSpPr>
+            <a:spLocks noGrp="1"/>
+          </p:cNvSpPr>
+          <p:nvPr>
+            <p:ph type="hdr" sz="quarter"/>
+          </p:nvPr>
+        </p:nvSpPr>
+        <p:spPr>
+          <a:xfrm>
+            <a:off x="0" y="0"/>
+            <a:ext cx="2971800" cy="458788"/>
+          </a:xfrm>
+          <a:prstGeom prst="rect">
+            <a:avLst/>
+          </a:prstGeom>
+        </p:spPr>
+        <p:txBody>
+          <a:bodyPr vert="horz" lIns="91440" tIns="45720" rIns="91440" bIns="45720" rtlCol="0"/>
+          <a:lstStyle>
+            <a:lvl1pPr algn="l">
+              <a:defRPr sz="1200"/>
+            </a:lvl1pPr>
+          </a:lstStyle>
+          <a:p>
+            <a:endParaRPr lang="fr-FR"/>
+          </a:p>
+        </p:txBody>
+      </p:sp>
+      <p:sp>
+        <p:nvSpPr>
+          <p:cNvPr id="3" name="Espace réservé de la date 2"/>
+          <p:cNvSpPr>
+            <a:spLocks noGrp="1"/>
+          </p:cNvSpPr>
+          <p:nvPr>
+            <p:ph type="dt" idx="1"/>
+          </p:nvPr>
+        </p:nvSpPr>
+        <p:spPr>
+          <a:xfrm>
+            <a:off x="3884613" y="0"/>
+            <a:ext cx="2971800" cy="458788"/>
+          </a:xfrm>
+          <a:prstGeom prst="rect">
+            <a:avLst/>
+          </a:prstGeom>
+        </p:spPr>
+        <p:txBody>
+          <a:bodyPr vert="horz" lIns="91440" tIns="45720" rIns="91440" bIns="45720" rtlCol="0"/>
+          <a:lstStyle>
+            <a:lvl1pPr algn="r">
+              <a:defRPr sz="1200"/>
+            </a:lvl1pPr>
+          </a:lstStyle>
+          <a:p>
+            <a:fld id="{FB9F24F5-B46D-4E9C-9C55-2AD854080310}" type="datetimeFigureOut">
+              <a:rPr lang="fr-FR" smtClean="0"/>
+              <a:t>11/05/2017</a:t>
+            </a:fld>
+            <a:endParaRPr lang="fr-FR"/>
+          </a:p>
+        </p:txBody>
+      </p:sp>
+      <p:sp>
+        <p:nvSpPr>
+          <p:cNvPr id="4" name="Espace réservé de l'image des diapositives 3"/>
+          <p:cNvSpPr>
+            <a:spLocks noGrp="1" noRot="1" noChangeAspect="1"/>
+          </p:cNvSpPr>
+          <p:nvPr>
+            <p:ph type="sldImg" idx="2"/>
+          </p:nvPr>
+        </p:nvSpPr>
+        <p:spPr>
+          <a:xfrm>
+            <a:off x="685800" y="1143000"/>
+            <a:ext cx="5486400" cy="3086100"/>
+          </a:xfrm>
+          <a:prstGeom prst="rect">
+            <a:avLst/>
+          </a:prstGeom>
+          <a:noFill/>
+          <a:ln w="12700">
+            <a:solidFill>
+              <a:prstClr val="black"/>
+            </a:solidFill>
+          </a:ln>
+        </p:spPr>
+        <p:txBody>
+          <a:bodyPr vert="horz" lIns="91440" tIns="45720" rIns="91440" bIns="45720" rtlCol="0" anchor="ctr"/>
+          <a:lstStyle/>
+          <a:p>
+            <a:endParaRPr lang="fr-FR"/>
+          </a:p>
+        </p:txBody>
+      </p:sp>
+      <p:sp>
+        <p:nvSpPr>
+          <p:cNvPr id="5" name="Espace réservé des notes 4"/>
+          <p:cNvSpPr>
+            <a:spLocks noGrp="1"/>
+          </p:cNvSpPr>
+          <p:nvPr>
+            <p:ph type="body" sz="quarter" idx="3"/>
+          </p:nvPr>
+        </p:nvSpPr>
+        <p:spPr>
+          <a:xfrm>
+            <a:off x="685800" y="4400550"/>
+            <a:ext cx="5486400" cy="3600450"/>
+          </a:xfrm>
+          <a:prstGeom prst="rect">
+            <a:avLst/>
+          </a:prstGeom>
+        </p:spPr>
+        <p:txBody>
+          <a:bodyPr vert="horz" lIns="91440" tIns="45720" rIns="91440" bIns="45720" rtlCol="0"/>
+          <a:lstStyle/>
+          <a:p>
+            <a:pPr lvl="0"/>
+            <a:r>
+              <a:rPr lang="fr-FR"/>
+              <a:t>Modifier les styles du texte du masque</a:t>
+            </a:r>
+          </a:p>
+          <a:p>
+            <a:pPr lvl="1"/>
+            <a:r>
+              <a:rPr lang="fr-FR"/>
+              <a:t>Deuxième niveau</a:t>
+            </a:r>
+          </a:p>
+          <a:p>
+            <a:pPr lvl="2"/>
+            <a:r>
+              <a:rPr lang="fr-FR"/>
+              <a:t>Troisième niveau</a:t>
+            </a:r>
+          </a:p>
+          <a:p>
+            <a:pPr lvl="3"/>
+            <a:r>
+              <a:rPr lang="fr-FR"/>
+              <a:t>Quatrième niveau</a:t>
+            </a:r>
+          </a:p>
+          <a:p>
+            <a:pPr lvl="4"/>
+            <a:r>
+              <a:rPr lang="fr-FR"/>
+              <a:t>Cinquième niveau</a:t>
+            </a:r>
+          </a:p>
+        </p:txBody>
+      </p:sp>
+      <p:sp>
+        <p:nvSpPr>
+          <p:cNvPr id="6" name="Espace réservé du pied de page 5"/>
+          <p:cNvSpPr>
+            <a:spLocks noGrp="1"/>
+          </p:cNvSpPr>
+          <p:nvPr>
+            <p:ph type="ftr" sz="quarter" idx="4"/>
+          </p:nvPr>
+        </p:nvSpPr>
+        <p:spPr>
+          <a:xfrm>
+            <a:off x="0" y="8685213"/>
+            <a:ext cx="2971800" cy="458787"/>
+          </a:xfrm>
+          <a:prstGeom prst="rect">
+            <a:avLst/>
+          </a:prstGeom>
+        </p:spPr>
+        <p:txBody>
+          <a:bodyPr vert="horz" lIns="91440" tIns="45720" rIns="91440" bIns="45720" rtlCol="0" anchor="b"/>
+          <a:lstStyle>
+            <a:lvl1pPr algn="l">
+              <a:defRPr sz="1200"/>
+            </a:lvl1pPr>
+          </a:lstStyle>
+          <a:p>
+            <a:endParaRPr lang="fr-FR"/>
+          </a:p>
+        </p:txBody>
+      </p:sp>
+      <p:sp>
+        <p:nvSpPr>
+          <p:cNvPr id="7" name="Espace réservé du numéro de diapositive 6"/>
+          <p:cNvSpPr>
+            <a:spLocks noGrp="1"/>
+          </p:cNvSpPr>
+          <p:nvPr>
+            <p:ph type="sldNum" sz="quarter" idx="5"/>
+          </p:nvPr>
+        </p:nvSpPr>
+        <p:spPr>
+          <a:xfrm>
+            <a:off x="3884613" y="8685213"/>
+            <a:ext cx="2971800" cy="458787"/>
+          </a:xfrm>
+          <a:prstGeom prst="rect">
+            <a:avLst/>
+          </a:prstGeom>
+        </p:spPr>
+        <p:txBody>
+          <a:bodyPr vert="horz" lIns="91440" tIns="45720" rIns="91440" bIns="45720" rtlCol="0" anchor="b"/>
+          <a:lstStyle>
+            <a:lvl1pPr algn="r">
+              <a:defRPr sz="1200"/>
+            </a:lvl1pPr>
+          </a:lstStyle>
+          <a:p>
+            <a:fld id="{53D42553-1A19-496D-91B6-9CAEC9457BBE}" type="slidenum">
+              <a:rPr lang="fr-FR" smtClean="0"/>
+              <a:t>‹N°›</a:t>
+            </a:fld>
+            <a:endParaRPr lang="fr-FR"/>
+          </a:p>
+        </p:txBody>
+      </p:sp>
+    </p:spTree>
+    <p:extLst>
+      <p:ext uri="{BB962C8B-B14F-4D97-AF65-F5344CB8AC3E}">
+        <p14:creationId xmlns:p14="http://schemas.microsoft.com/office/powerpoint/2010/main" val="184130674"/>
+      </p:ext>
+    </p:extLst>
+  </p:cSld>
+  <p:clrMap bg1="lt1" tx1="dk1" bg2="lt2" tx2="dk2" accent1="accent1" accent2="accent2" accent3="accent3" accent4="accent4" accent5="accent5" accent6="accent6" hlink="hlink" folHlink="folHlink"/>
+  <p:notesStyle>
+    <a:lvl1pPr marL="0" algn="l" defTabSz="914400" rtl="0" eaLnBrk="1" latinLnBrk="0" hangingPunct="1">
+      <a:defRPr sz="1200" kern="1200">
+        <a:solidFill>
+          <a:schemeClr val="tx1"/>
+        </a:solidFill>
+        <a:latin typeface="+mn-lt"/>
+        <a:ea typeface="+mn-ea"/>
+        <a:cs typeface="+mn-cs"/>
+      </a:defRPr>
+    </a:lvl1pPr>
+    <a:lvl2pPr marL="457200" algn="l" defTabSz="914400" rtl="0" eaLnBrk="1" latinLnBrk="0" hangingPunct="1">
+      <a:defRPr sz="1200" kern="1200">
+        <a:solidFill>
+          <a:schemeClr val="tx1"/>
+        </a:solidFill>
+        <a:latin typeface="+mn-lt"/>
+        <a:ea typeface="+mn-ea"/>
+        <a:cs typeface="+mn-cs"/>
+      </a:defRPr>
+    </a:lvl2pPr>
+    <a:lvl3pPr marL="914400" algn="l" defTabSz="914400" rtl="0" eaLnBrk="1" latinLnBrk="0" hangingPunct="1">
+      <a:defRPr sz="1200" kern="1200">
+        <a:solidFill>
+          <a:schemeClr val="tx1"/>
+        </a:solidFill>
+        <a:latin typeface="+mn-lt"/>
+        <a:ea typeface="+mn-ea"/>
+        <a:cs typeface="+mn-cs"/>
+      </a:defRPr>
+    </a:lvl3pPr>
+    <a:lvl4pPr marL="1371600" algn="l" defTabSz="914400" rtl="0" eaLnBrk="1" latinLnBrk="0" hangingPunct="1">
+      <a:defRPr sz="1200" kern="1200">
+        <a:solidFill>
+          <a:schemeClr val="tx1"/>
+        </a:solidFill>
+        <a:latin typeface="+mn-lt"/>
+        <a:ea typeface="+mn-ea"/>
+        <a:cs typeface="+mn-cs"/>
+      </a:defRPr>
+    </a:lvl4pPr>
+    <a:lvl5pPr marL="1828800" algn="l" defTabSz="914400" rtl="0" eaLnBrk="1" latinLnBrk="0" hangingPunct="1">
+      <a:defRPr sz="1200" kern="1200">
+        <a:solidFill>
+          <a:schemeClr val="tx1"/>
+        </a:solidFill>
+        <a:latin typeface="+mn-lt"/>
+        <a:ea typeface="+mn-ea"/>
+        <a:cs typeface="+mn-cs"/>
+      </a:defRPr>
+    </a:lvl5pPr>
+    <a:lvl6pPr marL="2286000" algn="l" defTabSz="914400" rtl="0" eaLnBrk="1" latinLnBrk="0" hangingPunct="1">
+      <a:defRPr sz="1200" kern="1200">
+        <a:solidFill>
+          <a:schemeClr val="tx1"/>
+        </a:solidFill>
+        <a:latin typeface="+mn-lt"/>
+        <a:ea typeface="+mn-ea"/>
+        <a:cs typeface="+mn-cs"/>
+      </a:defRPr>
+    </a:lvl6pPr>
+    <a:lvl7pPr marL="2743200" algn="l" defTabSz="914400" rtl="0" eaLnBrk="1" latinLnBrk="0" hangingPunct="1">
+      <a:defRPr sz="1200" kern="1200">
+        <a:solidFill>
+          <a:schemeClr val="tx1"/>
+        </a:solidFill>
+        <a:latin typeface="+mn-lt"/>
+        <a:ea typeface="+mn-ea"/>
+        <a:cs typeface="+mn-cs"/>
+      </a:defRPr>
+    </a:lvl7pPr>
+    <a:lvl8pPr marL="3200400" algn="l" defTabSz="914400" rtl="0" eaLnBrk="1" latinLnBrk="0" hangingPunct="1">
+      <a:defRPr sz="1200" kern="1200">
+        <a:solidFill>
+          <a:schemeClr val="tx1"/>
+        </a:solidFill>
+        <a:latin typeface="+mn-lt"/>
+        <a:ea typeface="+mn-ea"/>
+        <a:cs typeface="+mn-cs"/>
+      </a:defRPr>
+    </a:lvl8pPr>
+    <a:lvl9pPr marL="3657600" algn="l" defTabSz="914400" rtl="0" eaLnBrk="1" latinLnBrk="0" hangingPunct="1">
+      <a:defRPr sz="1200" kern="1200">
+        <a:solidFill>
+          <a:schemeClr val="tx1"/>
+        </a:solidFill>
+        <a:latin typeface="+mn-lt"/>
+        <a:ea typeface="+mn-ea"/>
+        <a:cs typeface="+mn-cs"/>
+      </a:defRPr>
+    </a:lvl9pPr>
+  </p:notesStyle>
+</p:notesMaster>
+</file>
+
 <file path=ppt/slideLayouts/slideLayout1.xml><?xml version="1.0" encoding="utf-8"?>
 <p:sldLayout xmlns:a="http://schemas.openxmlformats.org/drawingml/2006/main" xmlns:r="http://schemas.openxmlformats.org/officeDocument/2006/relationships" xmlns:p="http://schemas.openxmlformats.org/presentationml/2006/main" type="title" preserve="1">
   <p:cSld name="Diapositive de titre">
@@ -288,8 +640,8 @@
           <a:bodyPr/>
           <a:lstStyle/>
           <a:p>
-            <a:fld id="{48A87A34-81AB-432B-8DAE-1953F412C126}" type="datetimeFigureOut">
-              <a:rPr lang="en-US" dirty="0"/>
+            <a:fld id="{21237731-0972-4D5F-9F9C-8C3B4E54DBA0}" type="datetime1">
+              <a:rPr lang="en-US" smtClean="0"/>
               <a:t>5/11/2017</a:t>
             </a:fld>
             <a:endParaRPr lang="en-US" dirty="0"/>
@@ -598,8 +950,8 @@
           <a:bodyPr/>
           <a:lstStyle/>
           <a:p>
-            <a:fld id="{48A87A34-81AB-432B-8DAE-1953F412C126}" type="datetimeFigureOut">
-              <a:rPr lang="en-US" dirty="0"/>
+            <a:fld id="{B450534D-F1DF-4AB4-971E-95FD49B487C1}" type="datetime1">
+              <a:rPr lang="en-US" smtClean="0"/>
               <a:t>5/11/2017</a:t>
             </a:fld>
             <a:endParaRPr lang="en-US" dirty="0"/>
@@ -815,8 +1167,8 @@
           <a:bodyPr/>
           <a:lstStyle/>
           <a:p>
-            <a:fld id="{48A87A34-81AB-432B-8DAE-1953F412C126}" type="datetimeFigureOut">
-              <a:rPr lang="en-US" dirty="0"/>
+            <a:fld id="{CD7C5698-BA98-4152-B640-3F336EB3D0F9}" type="datetime1">
+              <a:rPr lang="en-US" smtClean="0"/>
               <a:t>5/11/2017</a:t>
             </a:fld>
             <a:endParaRPr lang="en-US" dirty="0"/>
@@ -1101,8 +1453,8 @@
           <a:bodyPr/>
           <a:lstStyle/>
           <a:p>
-            <a:fld id="{48A87A34-81AB-432B-8DAE-1953F412C126}" type="datetimeFigureOut">
-              <a:rPr lang="en-US" dirty="0"/>
+            <a:fld id="{5C5D37FF-3107-4642-B230-7BB24A7FD2D5}" type="datetime1">
+              <a:rPr lang="en-US" smtClean="0"/>
               <a:t>5/11/2017</a:t>
             </a:fld>
             <a:endParaRPr lang="en-US" dirty="0"/>
@@ -1550,8 +1902,8 @@
           <a:bodyPr/>
           <a:lstStyle/>
           <a:p>
-            <a:fld id="{48A87A34-81AB-432B-8DAE-1953F412C126}" type="datetimeFigureOut">
-              <a:rPr lang="en-US" dirty="0"/>
+            <a:fld id="{D2EC5B8E-848D-4A7B-AEB8-841140D32420}" type="datetime1">
+              <a:rPr lang="en-US" smtClean="0"/>
               <a:t>5/11/2017</a:t>
             </a:fld>
             <a:endParaRPr lang="en-US" dirty="0"/>
@@ -2121,8 +2473,8 @@
           <a:bodyPr/>
           <a:lstStyle/>
           <a:p>
-            <a:fld id="{48A87A34-81AB-432B-8DAE-1953F412C126}" type="datetimeFigureOut">
-              <a:rPr lang="en-US" dirty="0"/>
+            <a:fld id="{429DA288-288D-4A2C-8DE1-F171824A10B7}" type="datetime1">
+              <a:rPr lang="en-US" smtClean="0"/>
               <a:t>5/11/2017</a:t>
             </a:fld>
             <a:endParaRPr lang="en-US" dirty="0"/>
@@ -2977,8 +3329,8 @@
           <a:bodyPr/>
           <a:lstStyle/>
           <a:p>
-            <a:fld id="{48A87A34-81AB-432B-8DAE-1953F412C126}" type="datetimeFigureOut">
-              <a:rPr lang="en-US" dirty="0"/>
+            <a:fld id="{8CE3949F-CCE4-4CCA-95D9-C80612FE57D2}" type="datetime1">
+              <a:rPr lang="en-US" smtClean="0"/>
               <a:t>5/11/2017</a:t>
             </a:fld>
             <a:endParaRPr lang="en-US" dirty="0"/>
@@ -3177,8 +3529,8 @@
           <a:bodyPr/>
           <a:lstStyle/>
           <a:p>
-            <a:fld id="{48A87A34-81AB-432B-8DAE-1953F412C126}" type="datetimeFigureOut">
-              <a:rPr lang="en-US" dirty="0"/>
+            <a:fld id="{A535B4ED-4781-4991-8864-CF7AD1CDFAEE}" type="datetime1">
+              <a:rPr lang="en-US" smtClean="0"/>
               <a:t>5/11/2017</a:t>
             </a:fld>
             <a:endParaRPr lang="en-US" dirty="0"/>
@@ -3386,8 +3738,8 @@
           <a:bodyPr/>
           <a:lstStyle/>
           <a:p>
-            <a:fld id="{48A87A34-81AB-432B-8DAE-1953F412C126}" type="datetimeFigureOut">
-              <a:rPr lang="en-US" dirty="0"/>
+            <a:fld id="{EACA8601-010C-4CDA-B354-84983169AA55}" type="datetime1">
+              <a:rPr lang="en-US" smtClean="0"/>
               <a:t>5/11/2017</a:t>
             </a:fld>
             <a:endParaRPr lang="en-US" dirty="0"/>
@@ -3586,8 +3938,8 @@
           <a:bodyPr/>
           <a:lstStyle/>
           <a:p>
-            <a:fld id="{48A87A34-81AB-432B-8DAE-1953F412C126}" type="datetimeFigureOut">
-              <a:rPr lang="en-US" dirty="0"/>
+            <a:fld id="{98C933F4-4D87-4263-9C78-6738C2E735C6}" type="datetime1">
+              <a:rPr lang="en-US" smtClean="0"/>
               <a:t>5/11/2017</a:t>
             </a:fld>
             <a:endParaRPr lang="en-US" dirty="0"/>
@@ -3861,8 +4213,8 @@
           <a:bodyPr/>
           <a:lstStyle/>
           <a:p>
-            <a:fld id="{48A87A34-81AB-432B-8DAE-1953F412C126}" type="datetimeFigureOut">
-              <a:rPr lang="en-US" dirty="0"/>
+            <a:fld id="{7376E497-8D9D-4F42-9FCA-FC4678FF0F15}" type="datetime1">
+              <a:rPr lang="en-US" smtClean="0"/>
               <a:t>5/11/2017</a:t>
             </a:fld>
             <a:endParaRPr lang="en-US" dirty="0"/>
@@ -4123,8 +4475,8 @@
           <a:bodyPr/>
           <a:lstStyle/>
           <a:p>
-            <a:fld id="{48A87A34-81AB-432B-8DAE-1953F412C126}" type="datetimeFigureOut">
-              <a:rPr lang="en-US" dirty="0"/>
+            <a:fld id="{8B8749DA-AE31-43B6-B9F4-D432C8F42EF8}" type="datetime1">
+              <a:rPr lang="en-US" smtClean="0"/>
               <a:t>5/11/2017</a:t>
             </a:fld>
             <a:endParaRPr lang="en-US" dirty="0"/>
@@ -4533,8 +4885,8 @@
           <a:bodyPr/>
           <a:lstStyle/>
           <a:p>
-            <a:fld id="{48A87A34-81AB-432B-8DAE-1953F412C126}" type="datetimeFigureOut">
-              <a:rPr lang="en-US" dirty="0"/>
+            <a:fld id="{0B263290-3450-4E67-B446-4D5968DD03FF}" type="datetime1">
+              <a:rPr lang="en-US" smtClean="0"/>
               <a:t>5/11/2017</a:t>
             </a:fld>
             <a:endParaRPr lang="en-US" dirty="0"/>
@@ -4676,8 +5028,8 @@
           <a:bodyPr/>
           <a:lstStyle/>
           <a:p>
-            <a:fld id="{48A87A34-81AB-432B-8DAE-1953F412C126}" type="datetimeFigureOut">
-              <a:rPr lang="en-US" dirty="0"/>
+            <a:fld id="{3A0B6D5A-5CEC-4313-A9A5-6B818C4A773F}" type="datetime1">
+              <a:rPr lang="en-US" smtClean="0"/>
               <a:t>5/11/2017</a:t>
             </a:fld>
             <a:endParaRPr lang="en-US" dirty="0"/>
@@ -4796,8 +5148,8 @@
           <a:bodyPr/>
           <a:lstStyle/>
           <a:p>
-            <a:fld id="{48A87A34-81AB-432B-8DAE-1953F412C126}" type="datetimeFigureOut">
-              <a:rPr lang="en-US" dirty="0"/>
+            <a:fld id="{EC5576B5-6210-454B-9E4F-D6E6FB6D27B0}" type="datetime1">
+              <a:rPr lang="en-US" smtClean="0"/>
               <a:t>5/11/2017</a:t>
             </a:fld>
             <a:endParaRPr lang="en-US" dirty="0"/>
@@ -5070,8 +5422,8 @@
           <a:bodyPr/>
           <a:lstStyle/>
           <a:p>
-            <a:fld id="{48A87A34-81AB-432B-8DAE-1953F412C126}" type="datetimeFigureOut">
-              <a:rPr lang="en-US" dirty="0"/>
+            <a:fld id="{1AB517E2-7C64-455E-9D07-20F849A507E2}" type="datetime1">
+              <a:rPr lang="en-US" smtClean="0"/>
               <a:t>5/11/2017</a:t>
             </a:fld>
             <a:endParaRPr lang="en-US" dirty="0"/>
@@ -5380,8 +5732,8 @@
           <a:bodyPr/>
           <a:lstStyle/>
           <a:p>
-            <a:fld id="{48A87A34-81AB-432B-8DAE-1953F412C126}" type="datetimeFigureOut">
-              <a:rPr lang="en-US" dirty="0"/>
+            <a:fld id="{C8454EAD-BFC5-4583-AF6A-E5E19506BE2E}" type="datetime1">
+              <a:rPr lang="en-US" smtClean="0"/>
               <a:t>5/11/2017</a:t>
             </a:fld>
             <a:endParaRPr lang="en-US" dirty="0"/>
@@ -5628,9 +5980,8 @@
             </a:lvl1pPr>
           </a:lstStyle>
           <a:p>
-            <a:fld id="{48A87A34-81AB-432B-8DAE-1953F412C126}" type="datetimeFigureOut">
-              <a:rPr lang="en-US" dirty="0"/>
-              <a:pPr/>
+            <a:fld id="{18CC80E3-9084-4E5C-9A6F-43DB5C92D185}" type="datetime1">
+              <a:rPr lang="en-US" smtClean="0"/>
               <a:t>5/11/2017</a:t>
             </a:fld>
             <a:endParaRPr lang="en-US" dirty="0"/>
@@ -5734,6 +6085,7 @@
     <p:sldLayoutId id="2147483658" r:id="rId16"/>
     <p:sldLayoutId id="2147483659" r:id="rId17"/>
   </p:sldLayoutIdLst>
+  <p:hf hdr="0" ftr="0" dt="0"/>
   <p:txStyles>
     <p:titleStyle>
       <a:lvl1pPr algn="ctr" defTabSz="914400" rtl="0" eaLnBrk="1" latinLnBrk="0" hangingPunct="1">
@@ -6122,6 +6474,34 @@
           </a:p>
         </p:txBody>
       </p:sp>
+      <p:sp>
+        <p:nvSpPr>
+          <p:cNvPr id="5" name="Espace réservé du numéro de diapositive 4"/>
+          <p:cNvSpPr>
+            <a:spLocks noGrp="1"/>
+          </p:cNvSpPr>
+          <p:nvPr>
+            <p:ph type="sldNum" sz="quarter" idx="12"/>
+          </p:nvPr>
+        </p:nvSpPr>
+        <p:spPr>
+          <a:xfrm>
+            <a:off x="5305429" y="6146276"/>
+            <a:ext cx="764215" cy="356648"/>
+          </a:xfrm>
+        </p:spPr>
+        <p:txBody>
+          <a:bodyPr/>
+          <a:lstStyle/>
+          <a:p>
+            <a:fld id="{6D22F896-40B5-4ADD-8801-0D06FADFA095}" type="slidenum">
+              <a:rPr lang="en-US" sz="2000" smtClean="0"/>
+              <a:t>1</a:t>
+            </a:fld>
+            <a:endParaRPr lang="en-US" sz="2000" dirty="0"/>
+          </a:p>
+        </p:txBody>
+      </p:sp>
     </p:spTree>
     <p:extLst>
       <p:ext uri="{BB962C8B-B14F-4D97-AF65-F5344CB8AC3E}">
@@ -6252,6 +6632,34 @@
           </a:prstGeom>
         </p:spPr>
       </p:pic>
+      <p:sp>
+        <p:nvSpPr>
+          <p:cNvPr id="6" name="Espace réservé du numéro de diapositive 5"/>
+          <p:cNvSpPr>
+            <a:spLocks noGrp="1"/>
+          </p:cNvSpPr>
+          <p:nvPr>
+            <p:ph type="sldNum" sz="quarter" idx="12"/>
+          </p:nvPr>
+        </p:nvSpPr>
+        <p:spPr>
+          <a:xfrm>
+            <a:off x="5206721" y="6430029"/>
+            <a:ext cx="764215" cy="365125"/>
+          </a:xfrm>
+        </p:spPr>
+        <p:txBody>
+          <a:bodyPr/>
+          <a:lstStyle/>
+          <a:p>
+            <a:fld id="{6D22F896-40B5-4ADD-8801-0D06FADFA095}" type="slidenum">
+              <a:rPr lang="en-US" sz="2000" smtClean="0"/>
+              <a:t>2</a:t>
+            </a:fld>
+            <a:endParaRPr lang="en-US" sz="2000" dirty="0"/>
+          </a:p>
+        </p:txBody>
+      </p:sp>
     </p:spTree>
     <p:extLst>
       <p:ext uri="{BB962C8B-B14F-4D97-AF65-F5344CB8AC3E}">
@@ -6337,6 +6745,34 @@
           </a:prstGeom>
         </p:spPr>
       </p:pic>
+      <p:sp>
+        <p:nvSpPr>
+          <p:cNvPr id="4" name="Espace réservé du numéro de diapositive 3"/>
+          <p:cNvSpPr>
+            <a:spLocks noGrp="1"/>
+          </p:cNvSpPr>
+          <p:nvPr>
+            <p:ph type="sldNum" sz="quarter" idx="12"/>
+          </p:nvPr>
+        </p:nvSpPr>
+        <p:spPr>
+          <a:xfrm>
+            <a:off x="5423536" y="6354615"/>
+            <a:ext cx="764215" cy="365125"/>
+          </a:xfrm>
+        </p:spPr>
+        <p:txBody>
+          <a:bodyPr/>
+          <a:lstStyle/>
+          <a:p>
+            <a:fld id="{6D22F896-40B5-4ADD-8801-0D06FADFA095}" type="slidenum">
+              <a:rPr lang="en-US" sz="2000" smtClean="0"/>
+              <a:t>3</a:t>
+            </a:fld>
+            <a:endParaRPr lang="en-US" sz="2000" dirty="0"/>
+          </a:p>
+        </p:txBody>
+      </p:sp>
     </p:spTree>
     <p:extLst>
       <p:ext uri="{BB962C8B-B14F-4D97-AF65-F5344CB8AC3E}">
@@ -6386,7 +6822,7 @@
           <a:p>
             <a:r>
               <a:rPr lang="fr-FR" sz="4400" dirty="0"/>
-              <a:t>Le serveur local</a:t>
+              <a:t>Pour le serveur local</a:t>
             </a:r>
           </a:p>
         </p:txBody>
@@ -6403,27 +6839,56 @@
         </p:nvSpPr>
         <p:spPr/>
         <p:txBody>
-          <a:bodyPr>
-            <a:normAutofit/>
-          </a:bodyPr>
+          <a:bodyPr/>
           <a:lstStyle/>
           <a:p>
             <a:r>
               <a:rPr lang="fr-FR" sz="2800" dirty="0"/>
-              <a:t>Par manque de connaissances nous n’avons pas pu mettre un serveur local fonctionnel</a:t>
+              <a:t>Nous avons rencontré plusieurs problèmes pendant la réalisation d’un serveur local</a:t>
             </a:r>
           </a:p>
           <a:p>
             <a:r>
               <a:rPr lang="fr-FR" sz="2800" dirty="0"/>
-              <a:t>Nous avons eu des complications au niveau de la création du serveur ainsi qu’au niveau de la création d’index </a:t>
+              <a:t>Nous avons tenté d’utiliser SQL serveur, sans succès.</a:t>
             </a:r>
           </a:p>
           <a:p>
             <a:r>
               <a:rPr lang="fr-FR" sz="2800" dirty="0"/>
-              <a:t>Nous avons tenté d’utiliser web SQL, sans succès.</a:t>
-            </a:r>
+              <a:t>Nous avons eu des problèmes concernant la création du serveur ainsi que la création des index sur indexed database.</a:t>
+            </a:r>
+          </a:p>
+          <a:p>
+            <a:endParaRPr lang="fr-FR" dirty="0"/>
+          </a:p>
+        </p:txBody>
+      </p:sp>
+      <p:sp>
+        <p:nvSpPr>
+          <p:cNvPr id="5" name="Espace réservé du numéro de diapositive 4"/>
+          <p:cNvSpPr>
+            <a:spLocks noGrp="1"/>
+          </p:cNvSpPr>
+          <p:nvPr>
+            <p:ph type="sldNum" sz="quarter" idx="12"/>
+          </p:nvPr>
+        </p:nvSpPr>
+        <p:spPr>
+          <a:xfrm>
+            <a:off x="5470670" y="6260347"/>
+            <a:ext cx="764215" cy="365125"/>
+          </a:xfrm>
+        </p:spPr>
+        <p:txBody>
+          <a:bodyPr/>
+          <a:lstStyle/>
+          <a:p>
+            <a:fld id="{6D22F896-40B5-4ADD-8801-0D06FADFA095}" type="slidenum">
+              <a:rPr lang="en-US" sz="2000" smtClean="0"/>
+              <a:t>4</a:t>
+            </a:fld>
+            <a:endParaRPr lang="en-US" sz="2000" dirty="0"/>
           </a:p>
         </p:txBody>
       </p:sp>
@@ -6702,4 +7167,299 @@
     </a:ext>
   </a:extLst>
 </a:theme>
+</file>
+
+<file path=ppt/theme/theme2.xml><?xml version="1.0" encoding="utf-8"?>
+<a:theme xmlns:a="http://schemas.openxmlformats.org/drawingml/2006/main" name="Thème Office">
+  <a:themeElements>
+    <a:clrScheme name="Office">
+      <a:dk1>
+        <a:sysClr val="windowText" lastClr="000000"/>
+      </a:dk1>
+      <a:lt1>
+        <a:sysClr val="window" lastClr="FFFFFF"/>
+      </a:lt1>
+      <a:dk2>
+        <a:srgbClr val="44546A"/>
+      </a:dk2>
+      <a:lt2>
+        <a:srgbClr val="E7E6E6"/>
+      </a:lt2>
+      <a:accent1>
+        <a:srgbClr val="4472C4"/>
+      </a:accent1>
+      <a:accent2>
+        <a:srgbClr val="ED7D31"/>
+      </a:accent2>
+      <a:accent3>
+        <a:srgbClr val="A5A5A5"/>
+      </a:accent3>
+      <a:accent4>
+        <a:srgbClr val="FFC000"/>
+      </a:accent4>
+      <a:accent5>
+        <a:srgbClr val="5B9BD5"/>
+      </a:accent5>
+      <a:accent6>
+        <a:srgbClr val="70AD47"/>
+      </a:accent6>
+      <a:hlink>
+        <a:srgbClr val="0563C1"/>
+      </a:hlink>
+      <a:folHlink>
+        <a:srgbClr val="954F72"/>
+      </a:folHlink>
+    </a:clrScheme>
+    <a:fontScheme name="Office">
+      <a:majorFont>
+        <a:latin typeface="Calibri Light" panose="020F0302020204030204"/>
+        <a:ea typeface=""/>
+        <a:cs typeface=""/>
+        <a:font script="Jpan" typeface="游ゴシック Light"/>
+        <a:font script="Hang" typeface="맑은 고딕"/>
+        <a:font script="Hans" typeface="等线 Light"/>
+        <a:font script="Hant" typeface="新細明體"/>
+        <a:font script="Arab" typeface="Times New Roman"/>
+        <a:font script="Hebr" typeface="Times New Roman"/>
+        <a:font script="Thai" typeface="Angsana New"/>
+        <a:font script="Ethi" typeface="Nyala"/>
+        <a:font script="Beng" typeface="Vrinda"/>
+        <a:font script="Gujr" typeface="Shruti"/>
+        <a:font script="Khmr" typeface="MoolBoran"/>
+        <a:font script="Knda" typeface="Tunga"/>
+        <a:font script="Guru" typeface="Raavi"/>
+        <a:font script="Cans" typeface="Euphemia"/>
+        <a:font script="Cher" typeface="Plantagenet Cherokee"/>
+        <a:font script="Yiii" typeface="Microsoft Yi Baiti"/>
+        <a:font script="Tibt" typeface="Microsoft Himalaya"/>
+        <a:font script="Thaa" typeface="MV Boli"/>
+        <a:font script="Deva" typeface="Mangal"/>
+        <a:font script="Telu" typeface="Gautami"/>
+        <a:font script="Taml" typeface="Latha"/>
+        <a:font script="Syrc" typeface="Estrangelo Edessa"/>
+        <a:font script="Orya" typeface="Kalinga"/>
+        <a:font script="Mlym" typeface="Kartika"/>
+        <a:font script="Laoo" typeface="DokChampa"/>
+        <a:font script="Sinh" typeface="Iskoola Pota"/>
+        <a:font script="Mong" typeface="Mongolian Baiti"/>
+        <a:font script="Viet" typeface="Times New Roman"/>
+        <a:font script="Uigh" typeface="Microsoft Uighur"/>
+        <a:font script="Geor" typeface="Sylfaen"/>
+        <a:font script="Armn" typeface="Arial"/>
+        <a:font script="Bugi" typeface="Leelawadee UI"/>
+        <a:font script="Bopo" typeface="Microsoft JhengHei"/>
+        <a:font script="Java" typeface="Javanese Text"/>
+        <a:font script="Lisu" typeface="Segoe UI"/>
+        <a:font script="Mymr" typeface="Myanmar Text"/>
+        <a:font script="Nkoo" typeface="Ebrima"/>
+        <a:font script="Olck" typeface="Nirmala UI"/>
+        <a:font script="Osma" typeface="Ebrima"/>
+        <a:font script="Phag" typeface="Phagspa"/>
+        <a:font script="Syrn" typeface="Estrangelo Edessa"/>
+        <a:font script="Syrj" typeface="Estrangelo Edessa"/>
+        <a:font script="Syre" typeface="Estrangelo Edessa"/>
+        <a:font script="Sora" typeface="Nirmala UI"/>
+        <a:font script="Tale" typeface="Microsoft Tai Le"/>
+        <a:font script="Talu" typeface="Microsoft New Tai Lue"/>
+        <a:font script="Tfng" typeface="Ebrima"/>
+      </a:majorFont>
+      <a:minorFont>
+        <a:latin typeface="Calibri" panose="020F0502020204030204"/>
+        <a:ea typeface=""/>
+        <a:cs typeface=""/>
+        <a:font script="Jpan" typeface="游ゴシック"/>
+        <a:font script="Hang" typeface="맑은 고딕"/>
+        <a:font script="Hans" typeface="等线"/>
+        <a:font script="Hant" typeface="新細明體"/>
+        <a:font script="Arab" typeface="Arial"/>
+        <a:font script="Hebr" typeface="Arial"/>
+        <a:font script="Thai" typeface="Cordia New"/>
+        <a:font script="Ethi" typeface="Nyala"/>
+        <a:font script="Beng" typeface="Vrinda"/>
+        <a:font script="Gujr" typeface="Shruti"/>
+        <a:font script="Khmr" typeface="DaunPenh"/>
+        <a:font script="Knda" typeface="Tunga"/>
+        <a:font script="Guru" typeface="Raavi"/>
+        <a:font script="Cans" typeface="Euphemia"/>
+        <a:font script="Cher" typeface="Plantagenet Cherokee"/>
+        <a:font script="Yiii" typeface="Microsoft Yi Baiti"/>
+        <a:font script="Tibt" typeface="Microsoft Himalaya"/>
+        <a:font script="Thaa" typeface="MV Boli"/>
+        <a:font script="Deva" typeface="Mangal"/>
+        <a:font script="Telu" typeface="Gautami"/>
+        <a:font script="Taml" typeface="Latha"/>
+        <a:font script="Syrc" typeface="Estrangelo Edessa"/>
+        <a:font script="Orya" typeface="Kalinga"/>
+        <a:font script="Mlym" typeface="Kartika"/>
+        <a:font script="Laoo" typeface="DokChampa"/>
+        <a:font script="Sinh" typeface="Iskoola Pota"/>
+        <a:font script="Mong" typeface="Mongolian Baiti"/>
+        <a:font script="Viet" typeface="Arial"/>
+        <a:font script="Uigh" typeface="Microsoft Uighur"/>
+        <a:font script="Geor" typeface="Sylfaen"/>
+        <a:font script="Armn" typeface="Arial"/>
+        <a:font script="Bugi" typeface="Leelawadee UI"/>
+        <a:font script="Bopo" typeface="Microsoft JhengHei"/>
+        <a:font script="Java" typeface="Javanese Text"/>
+        <a:font script="Lisu" typeface="Segoe UI"/>
+        <a:font script="Mymr" typeface="Myanmar Text"/>
+        <a:font script="Nkoo" typeface="Ebrima"/>
+        <a:font script="Olck" typeface="Nirmala UI"/>
+        <a:font script="Osma" typeface="Ebrima"/>
+        <a:font script="Phag" typeface="Phagspa"/>
+        <a:font script="Syrn" typeface="Estrangelo Edessa"/>
+        <a:font script="Syrj" typeface="Estrangelo Edessa"/>
+        <a:font script="Syre" typeface="Estrangelo Edessa"/>
+        <a:font script="Sora" typeface="Nirmala UI"/>
+        <a:font script="Tale" typeface="Microsoft Tai Le"/>
+        <a:font script="Talu" typeface="Microsoft New Tai Lue"/>
+        <a:font script="Tfng" typeface="Ebrima"/>
+      </a:minorFont>
+    </a:fontScheme>
+    <a:fmtScheme name="Office">
+      <a:fillStyleLst>
+        <a:solidFill>
+          <a:schemeClr val="phClr"/>
+        </a:solidFill>
+        <a:gradFill rotWithShape="1">
+          <a:gsLst>
+            <a:gs pos="0">
+              <a:schemeClr val="phClr">
+                <a:lumMod val="110000"/>
+                <a:satMod val="105000"/>
+                <a:tint val="67000"/>
+              </a:schemeClr>
+            </a:gs>
+            <a:gs pos="50000">
+              <a:schemeClr val="phClr">
+                <a:lumMod val="105000"/>
+                <a:satMod val="103000"/>
+                <a:tint val="73000"/>
+              </a:schemeClr>
+            </a:gs>
+            <a:gs pos="100000">
+              <a:schemeClr val="phClr">
+                <a:lumMod val="105000"/>
+                <a:satMod val="109000"/>
+                <a:tint val="81000"/>
+              </a:schemeClr>
+            </a:gs>
+          </a:gsLst>
+          <a:lin ang="5400000" scaled="0"/>
+        </a:gradFill>
+        <a:gradFill rotWithShape="1">
+          <a:gsLst>
+            <a:gs pos="0">
+              <a:schemeClr val="phClr">
+                <a:satMod val="103000"/>
+                <a:lumMod val="102000"/>
+                <a:tint val="94000"/>
+              </a:schemeClr>
+            </a:gs>
+            <a:gs pos="50000">
+              <a:schemeClr val="phClr">
+                <a:satMod val="110000"/>
+                <a:lumMod val="100000"/>
+                <a:shade val="100000"/>
+              </a:schemeClr>
+            </a:gs>
+            <a:gs pos="100000">
+              <a:schemeClr val="phClr">
+                <a:lumMod val="99000"/>
+                <a:satMod val="120000"/>
+                <a:shade val="78000"/>
+              </a:schemeClr>
+            </a:gs>
+          </a:gsLst>
+          <a:lin ang="5400000" scaled="0"/>
+        </a:gradFill>
+      </a:fillStyleLst>
+      <a:lnStyleLst>
+        <a:ln w="6350" cap="flat" cmpd="sng" algn="ctr">
+          <a:solidFill>
+            <a:schemeClr val="phClr"/>
+          </a:solidFill>
+          <a:prstDash val="solid"/>
+          <a:miter lim="800000"/>
+        </a:ln>
+        <a:ln w="12700" cap="flat" cmpd="sng" algn="ctr">
+          <a:solidFill>
+            <a:schemeClr val="phClr"/>
+          </a:solidFill>
+          <a:prstDash val="solid"/>
+          <a:miter lim="800000"/>
+        </a:ln>
+        <a:ln w="19050" cap="flat" cmpd="sng" algn="ctr">
+          <a:solidFill>
+            <a:schemeClr val="phClr"/>
+          </a:solidFill>
+          <a:prstDash val="solid"/>
+          <a:miter lim="800000"/>
+        </a:ln>
+      </a:lnStyleLst>
+      <a:effectStyleLst>
+        <a:effectStyle>
+          <a:effectLst/>
+        </a:effectStyle>
+        <a:effectStyle>
+          <a:effectLst/>
+        </a:effectStyle>
+        <a:effectStyle>
+          <a:effectLst>
+            <a:outerShdw blurRad="57150" dist="19050" dir="5400000" algn="ctr" rotWithShape="0">
+              <a:srgbClr val="000000">
+                <a:alpha val="63000"/>
+              </a:srgbClr>
+            </a:outerShdw>
+          </a:effectLst>
+        </a:effectStyle>
+      </a:effectStyleLst>
+      <a:bgFillStyleLst>
+        <a:solidFill>
+          <a:schemeClr val="phClr"/>
+        </a:solidFill>
+        <a:solidFill>
+          <a:schemeClr val="phClr">
+            <a:tint val="95000"/>
+            <a:satMod val="170000"/>
+          </a:schemeClr>
+        </a:solidFill>
+        <a:gradFill rotWithShape="1">
+          <a:gsLst>
+            <a:gs pos="0">
+              <a:schemeClr val="phClr">
+                <a:tint val="93000"/>
+                <a:satMod val="150000"/>
+                <a:shade val="98000"/>
+                <a:lumMod val="102000"/>
+              </a:schemeClr>
+            </a:gs>
+            <a:gs pos="50000">
+              <a:schemeClr val="phClr">
+                <a:tint val="98000"/>
+                <a:satMod val="130000"/>
+                <a:shade val="90000"/>
+                <a:lumMod val="103000"/>
+              </a:schemeClr>
+            </a:gs>
+            <a:gs pos="100000">
+              <a:schemeClr val="phClr">
+                <a:shade val="63000"/>
+                <a:satMod val="120000"/>
+              </a:schemeClr>
+            </a:gs>
+          </a:gsLst>
+          <a:lin ang="5400000" scaled="0"/>
+        </a:gradFill>
+      </a:bgFillStyleLst>
+    </a:fmtScheme>
+  </a:themeElements>
+  <a:objectDefaults/>
+  <a:extraClrSchemeLst/>
+  <a:extLst>
+    <a:ext uri="{05A4C25C-085E-4340-85A3-A5531E510DB2}">
+      <thm15:themeFamily xmlns:thm15="http://schemas.microsoft.com/office/thememl/2012/main" name="Office Theme" id="{62F939B6-93AF-4DB8-9C6B-D6C7DFDC589F}" vid="{4A3C46E8-61CC-4603-A589-7422A47A8E4A}"/>
+    </a:ext>
+  </a:extLst>
+</a:theme>
 </file>
</xml_diff>